<commit_message>
Created DrinksSeeds class to put seeds in later, started new Brands_repo for recommended Brands.
</commit_message>
<xml_diff>
--- a/Drinkable.pptx
+++ b/Drinkable.pptx
@@ -7,14 +7,15 @@
   <p:sldIdLst>
     <p:sldId id="256" r:id="rId2"/>
     <p:sldId id="257" r:id="rId3"/>
-    <p:sldId id="258" r:id="rId4"/>
-    <p:sldId id="259" r:id="rId5"/>
-    <p:sldId id="261" r:id="rId6"/>
-    <p:sldId id="260" r:id="rId7"/>
-    <p:sldId id="264" r:id="rId8"/>
-    <p:sldId id="262" r:id="rId9"/>
-    <p:sldId id="263" r:id="rId10"/>
-    <p:sldId id="265" r:id="rId11"/>
+    <p:sldId id="266" r:id="rId4"/>
+    <p:sldId id="261" r:id="rId5"/>
+    <p:sldId id="258" r:id="rId6"/>
+    <p:sldId id="259" r:id="rId7"/>
+    <p:sldId id="260" r:id="rId8"/>
+    <p:sldId id="264" r:id="rId9"/>
+    <p:sldId id="262" r:id="rId10"/>
+    <p:sldId id="263" r:id="rId11"/>
+    <p:sldId id="265" r:id="rId12"/>
   </p:sldIdLst>
   <p:sldSz cx="9144000" cy="6858000" type="screen4x3"/>
   <p:notesSz cx="6858000" cy="9144000"/>
@@ -7710,6 +7711,101 @@
         </p:nvSpPr>
         <p:spPr/>
         <p:txBody>
+          <a:bodyPr/>
+          <a:lstStyle/>
+          <a:p>
+            <a:r>
+              <a:rPr lang="en-US" dirty="0" smtClean="0"/>
+              <a:t>Things to do better.</a:t>
+            </a:r>
+            <a:endParaRPr lang="en-US" dirty="0"/>
+          </a:p>
+        </p:txBody>
+      </p:sp>
+      <p:sp>
+        <p:nvSpPr>
+          <p:cNvPr id="3" name="Content Placeholder 2"/>
+          <p:cNvSpPr>
+            <a:spLocks noGrp="1"/>
+          </p:cNvSpPr>
+          <p:nvPr>
+            <p:ph idx="1"/>
+          </p:nvPr>
+        </p:nvSpPr>
+        <p:spPr/>
+        <p:txBody>
+          <a:bodyPr/>
+          <a:lstStyle/>
+          <a:p>
+            <a:r>
+              <a:rPr lang="en-US" dirty="0" smtClean="0"/>
+              <a:t>More planning.</a:t>
+            </a:r>
+          </a:p>
+          <a:p>
+            <a:r>
+              <a:rPr lang="en-US" dirty="0" smtClean="0"/>
+              <a:t>Don’t read several tutorials at once.</a:t>
+            </a:r>
+          </a:p>
+          <a:p>
+            <a:r>
+              <a:rPr lang="en-US" dirty="0" smtClean="0"/>
+              <a:t>Better naming conventions.</a:t>
+            </a:r>
+            <a:endParaRPr lang="en-US" dirty="0"/>
+          </a:p>
+        </p:txBody>
+      </p:sp>
+    </p:spTree>
+    <p:extLst>
+      <p:ext uri="{BB962C8B-B14F-4D97-AF65-F5344CB8AC3E}">
+        <p14:creationId xmlns:p14="http://schemas.microsoft.com/office/powerpoint/2010/main" val="2734469215"/>
+      </p:ext>
+    </p:extLst>
+  </p:cSld>
+  <p:clrMapOvr>
+    <a:masterClrMapping/>
+  </p:clrMapOvr>
+  <p:timing>
+    <p:tnLst>
+      <p:par>
+        <p:cTn xmlns:p14="http://schemas.microsoft.com/office/powerpoint/2010/main" id="1" dur="indefinite" restart="never" nodeType="tmRoot"/>
+      </p:par>
+    </p:tnLst>
+  </p:timing>
+</p:sld>
+</file>
+
+<file path=ppt/slides/slide11.xml><?xml version="1.0" encoding="utf-8"?>
+<p:sld xmlns:a="http://schemas.openxmlformats.org/drawingml/2006/main" xmlns:r="http://schemas.openxmlformats.org/officeDocument/2006/relationships" xmlns:p="http://schemas.openxmlformats.org/presentationml/2006/main">
+  <p:cSld>
+    <p:spTree>
+      <p:nvGrpSpPr>
+        <p:cNvPr id="1" name=""/>
+        <p:cNvGrpSpPr/>
+        <p:nvPr/>
+      </p:nvGrpSpPr>
+      <p:grpSpPr>
+        <a:xfrm>
+          <a:off x="0" y="0"/>
+          <a:ext cx="0" cy="0"/>
+          <a:chOff x="0" y="0"/>
+          <a:chExt cx="0" cy="0"/>
+        </a:xfrm>
+      </p:grpSpPr>
+      <p:sp>
+        <p:nvSpPr>
+          <p:cNvPr id="2" name="Title 1"/>
+          <p:cNvSpPr>
+            <a:spLocks noGrp="1"/>
+          </p:cNvSpPr>
+          <p:nvPr>
+            <p:ph type="title"/>
+          </p:nvPr>
+        </p:nvSpPr>
+        <p:spPr/>
+        <p:txBody>
           <a:bodyPr>
             <a:normAutofit/>
           </a:bodyPr>
@@ -7782,6 +7878,13 @@
   <p:clrMapOvr>
     <a:masterClrMapping/>
   </p:clrMapOvr>
+  <p:timing>
+    <p:tnLst>
+      <p:par>
+        <p:cTn xmlns:p14="http://schemas.microsoft.com/office/powerpoint/2010/main" id="1" dur="indefinite" restart="never" nodeType="tmRoot"/>
+      </p:par>
+    </p:tnLst>
+  </p:timing>
 </p:sld>
 </file>
 
@@ -8084,7 +8187,7 @@
           <a:p>
             <a:r>
               <a:rPr lang="en-US" dirty="0" smtClean="0"/>
-              <a:t>Trials and Tribulations</a:t>
+              <a:t>MVP</a:t>
             </a:r>
             <a:endParaRPr lang="en-US" dirty="0"/>
           </a:p>
@@ -8107,27 +8210,7 @@
           <a:p>
             <a:r>
               <a:rPr lang="en-US" dirty="0" smtClean="0"/>
-              <a:t>Learning SQLite and more of the functionality of Android Studio was pretty tough.</a:t>
-            </a:r>
-          </a:p>
-          <a:p>
-            <a:r>
-              <a:rPr lang="en-US" dirty="0" smtClean="0"/>
-              <a:t>There are a lot of tutorials out there, however some are out of date and others take quite complicated route.</a:t>
-            </a:r>
-          </a:p>
-          <a:p>
-            <a:r>
-              <a:rPr lang="en-US" dirty="0" smtClean="0"/>
-              <a:t>EXAMPLE: One tutorial led me to creating a </a:t>
-            </a:r>
-            <a:r>
-              <a:rPr lang="en-US" dirty="0" err="1" smtClean="0"/>
-              <a:t>DataManager</a:t>
-            </a:r>
-            <a:r>
-              <a:rPr lang="en-US" dirty="0" smtClean="0"/>
-              <a:t> class which resulted in singleton methods and became rather confusing.</a:t>
+              <a:t>Just to display a list of cocktails based on ingredient choice.</a:t>
             </a:r>
             <a:endParaRPr lang="en-US" dirty="0"/>
           </a:p>
@@ -8136,7 +8219,7 @@
     </p:spTree>
     <p:extLst>
       <p:ext uri="{BB962C8B-B14F-4D97-AF65-F5344CB8AC3E}">
-        <p14:creationId xmlns:p14="http://schemas.microsoft.com/office/powerpoint/2010/main" val="1634783641"/>
+        <p14:creationId xmlns:p14="http://schemas.microsoft.com/office/powerpoint/2010/main" val="3379043831"/>
       </p:ext>
     </p:extLst>
   </p:cSld>
@@ -8146,177 +8229,7 @@
   <p:timing>
     <p:tnLst>
       <p:par>
-        <p:cTn xmlns:p14="http://schemas.microsoft.com/office/powerpoint/2010/main" id="1" dur="indefinite" restart="never" nodeType="tmRoot">
-          <p:childTnLst>
-            <p:seq concurrent="1" nextAc="seek">
-              <p:cTn id="2" dur="indefinite" nodeType="mainSeq">
-                <p:childTnLst>
-                  <p:par>
-                    <p:cTn id="3" fill="hold">
-                      <p:stCondLst>
-                        <p:cond delay="indefinite"/>
-                      </p:stCondLst>
-                      <p:childTnLst>
-                        <p:par>
-                          <p:cTn id="4" fill="hold">
-                            <p:stCondLst>
-                              <p:cond delay="0"/>
-                            </p:stCondLst>
-                            <p:childTnLst>
-                              <p:par>
-                                <p:cTn id="5" presetID="1" presetClass="entr" presetSubtype="0" fill="hold" nodeType="clickEffect">
-                                  <p:stCondLst>
-                                    <p:cond delay="0"/>
-                                  </p:stCondLst>
-                                  <p:childTnLst>
-                                    <p:set>
-                                      <p:cBhvr>
-                                        <p:cTn id="6" dur="1" fill="hold">
-                                          <p:stCondLst>
-                                            <p:cond delay="0"/>
-                                          </p:stCondLst>
-                                        </p:cTn>
-                                        <p:tgtEl>
-                                          <p:spTgt spid="3">
-                                            <p:txEl>
-                                              <p:pRg st="0" end="0"/>
-                                            </p:txEl>
-                                          </p:spTgt>
-                                        </p:tgtEl>
-                                        <p:attrNameLst>
-                                          <p:attrName>style.visibility</p:attrName>
-                                        </p:attrNameLst>
-                                      </p:cBhvr>
-                                      <p:to>
-                                        <p:strVal val="visible"/>
-                                      </p:to>
-                                    </p:set>
-                                  </p:childTnLst>
-                                </p:cTn>
-                              </p:par>
-                            </p:childTnLst>
-                          </p:cTn>
-                        </p:par>
-                      </p:childTnLst>
-                    </p:cTn>
-                  </p:par>
-                  <p:par>
-                    <p:cTn id="7" fill="hold">
-                      <p:stCondLst>
-                        <p:cond delay="indefinite"/>
-                      </p:stCondLst>
-                      <p:childTnLst>
-                        <p:par>
-                          <p:cTn id="8" fill="hold">
-                            <p:stCondLst>
-                              <p:cond delay="0"/>
-                            </p:stCondLst>
-                            <p:childTnLst>
-                              <p:par>
-                                <p:cTn id="9" presetID="1" presetClass="entr" presetSubtype="0" fill="hold" nodeType="clickEffect">
-                                  <p:stCondLst>
-                                    <p:cond delay="0"/>
-                                  </p:stCondLst>
-                                  <p:childTnLst>
-                                    <p:set>
-                                      <p:cBhvr>
-                                        <p:cTn id="10" dur="1" fill="hold">
-                                          <p:stCondLst>
-                                            <p:cond delay="0"/>
-                                          </p:stCondLst>
-                                        </p:cTn>
-                                        <p:tgtEl>
-                                          <p:spTgt spid="3">
-                                            <p:txEl>
-                                              <p:pRg st="1" end="1"/>
-                                            </p:txEl>
-                                          </p:spTgt>
-                                        </p:tgtEl>
-                                        <p:attrNameLst>
-                                          <p:attrName>style.visibility</p:attrName>
-                                        </p:attrNameLst>
-                                      </p:cBhvr>
-                                      <p:to>
-                                        <p:strVal val="visible"/>
-                                      </p:to>
-                                    </p:set>
-                                  </p:childTnLst>
-                                </p:cTn>
-                              </p:par>
-                            </p:childTnLst>
-                          </p:cTn>
-                        </p:par>
-                      </p:childTnLst>
-                    </p:cTn>
-                  </p:par>
-                  <p:par>
-                    <p:cTn id="11" fill="hold">
-                      <p:stCondLst>
-                        <p:cond delay="indefinite"/>
-                      </p:stCondLst>
-                      <p:childTnLst>
-                        <p:par>
-                          <p:cTn id="12" fill="hold">
-                            <p:stCondLst>
-                              <p:cond delay="0"/>
-                            </p:stCondLst>
-                            <p:childTnLst>
-                              <p:par>
-                                <p:cTn id="13" presetID="1" presetClass="entr" presetSubtype="0" fill="hold" nodeType="clickEffect">
-                                  <p:stCondLst>
-                                    <p:cond delay="0"/>
-                                  </p:stCondLst>
-                                  <p:childTnLst>
-                                    <p:set>
-                                      <p:cBhvr>
-                                        <p:cTn id="14" dur="1" fill="hold">
-                                          <p:stCondLst>
-                                            <p:cond delay="0"/>
-                                          </p:stCondLst>
-                                        </p:cTn>
-                                        <p:tgtEl>
-                                          <p:spTgt spid="3">
-                                            <p:txEl>
-                                              <p:pRg st="2" end="2"/>
-                                            </p:txEl>
-                                          </p:spTgt>
-                                        </p:tgtEl>
-                                        <p:attrNameLst>
-                                          <p:attrName>style.visibility</p:attrName>
-                                        </p:attrNameLst>
-                                      </p:cBhvr>
-                                      <p:to>
-                                        <p:strVal val="visible"/>
-                                      </p:to>
-                                    </p:set>
-                                  </p:childTnLst>
-                                </p:cTn>
-                              </p:par>
-                            </p:childTnLst>
-                          </p:cTn>
-                        </p:par>
-                      </p:childTnLst>
-                    </p:cTn>
-                  </p:par>
-                </p:childTnLst>
-              </p:cTn>
-              <p:prevCondLst>
-                <p:cond evt="onPrev" delay="0">
-                  <p:tgtEl>
-                    <p:sldTgt/>
-                  </p:tgtEl>
-                </p:cond>
-              </p:prevCondLst>
-              <p:nextCondLst>
-                <p:cond evt="onNext" delay="0">
-                  <p:tgtEl>
-                    <p:sldTgt/>
-                  </p:tgtEl>
-                </p:cond>
-              </p:nextCondLst>
-            </p:seq>
-          </p:childTnLst>
-        </p:cTn>
+        <p:cTn xmlns:p14="http://schemas.microsoft.com/office/powerpoint/2010/main" id="1" dur="indefinite" restart="never" nodeType="tmRoot"/>
       </p:par>
     </p:tnLst>
   </p:timing>
@@ -8357,7 +8270,7 @@
           <a:p>
             <a:r>
               <a:rPr lang="en-US" dirty="0" smtClean="0"/>
-              <a:t>More Issues</a:t>
+              <a:t>Planning</a:t>
             </a:r>
             <a:endParaRPr lang="en-US" dirty="0"/>
           </a:p>
@@ -8380,29 +8293,29 @@
           <a:p>
             <a:r>
               <a:rPr lang="en-US" dirty="0" smtClean="0"/>
-              <a:t>SQLite syntax.</a:t>
-            </a:r>
-          </a:p>
-          <a:p>
+              <a:t>Wire Frame designs helped a lot in terms of working out what functions would be needed where.</a:t>
+            </a:r>
+          </a:p>
+          <a:p>
+            <a:r>
+              <a:rPr lang="en-US" dirty="0" err="1" smtClean="0"/>
+              <a:t>MoSCoW</a:t>
+            </a:r>
             <a:r>
               <a:rPr lang="en-US" dirty="0" smtClean="0"/>
-              <a:t>It is not case-sensitive, so led to a lot of ambiguous errors.</a:t>
+              <a:t> for working out MVP.</a:t>
             </a:r>
           </a:p>
           <a:p>
             <a:r>
               <a:rPr lang="en-US" dirty="0" smtClean="0"/>
-              <a:t>Commas are important</a:t>
-            </a:r>
+              <a:t>Table diagrams helped to get my head around the many to many concept.</a:t>
+            </a:r>
+          </a:p>
+          <a:p>
             <a:r>
               <a:rPr lang="en-US" dirty="0" smtClean="0"/>
-              <a:t>.</a:t>
-            </a:r>
-          </a:p>
-          <a:p>
-            <a:r>
-              <a:rPr lang="en-US" dirty="0" smtClean="0"/>
-              <a:t>Changing versions every time a change is made to the database.</a:t>
+              <a:t>Class Diagrams and File Structure plan to work out what goes where and how things interact.</a:t>
             </a:r>
             <a:endParaRPr lang="en-US" dirty="0"/>
           </a:p>
@@ -8411,7 +8324,7 @@
     </p:spTree>
     <p:extLst>
       <p:ext uri="{BB962C8B-B14F-4D97-AF65-F5344CB8AC3E}">
-        <p14:creationId xmlns:p14="http://schemas.microsoft.com/office/powerpoint/2010/main" val="3040127520"/>
+        <p14:creationId xmlns:p14="http://schemas.microsoft.com/office/powerpoint/2010/main" val="1677045588"/>
       </p:ext>
     </p:extLst>
   </p:cSld>
@@ -8681,7 +8594,7 @@
           <a:p>
             <a:r>
               <a:rPr lang="en-US" dirty="0" smtClean="0"/>
-              <a:t>Planning</a:t>
+              <a:t>Trials and Tribulations</a:t>
             </a:r>
             <a:endParaRPr lang="en-US" dirty="0"/>
           </a:p>
@@ -8704,29 +8617,27 @@
           <a:p>
             <a:r>
               <a:rPr lang="en-US" dirty="0" smtClean="0"/>
-              <a:t>Wire Frame designs helped a lot in terms of working out what functions would be needed where.</a:t>
-            </a:r>
-          </a:p>
-          <a:p>
+              <a:t>Learning SQLite and more of the functionality of Android Studio was pretty tough.</a:t>
+            </a:r>
+          </a:p>
+          <a:p>
+            <a:r>
+              <a:rPr lang="en-US" dirty="0" smtClean="0"/>
+              <a:t>There are a lot of tutorials out there, however some are out of date and others take quite complicated route.</a:t>
+            </a:r>
+          </a:p>
+          <a:p>
+            <a:r>
+              <a:rPr lang="en-US" dirty="0" smtClean="0"/>
+              <a:t>EXAMPLE: One tutorial led me to creating a </a:t>
+            </a:r>
             <a:r>
               <a:rPr lang="en-US" dirty="0" err="1" smtClean="0"/>
-              <a:t>MoSCoW</a:t>
+              <a:t>DataManager</a:t>
             </a:r>
             <a:r>
               <a:rPr lang="en-US" dirty="0" smtClean="0"/>
-              <a:t> for working out MVP.</a:t>
-            </a:r>
-          </a:p>
-          <a:p>
-            <a:r>
-              <a:rPr lang="en-US" dirty="0" smtClean="0"/>
-              <a:t>Table diagrams helped to get my head around the many to many concept.</a:t>
-            </a:r>
-          </a:p>
-          <a:p>
-            <a:r>
-              <a:rPr lang="en-US" dirty="0" smtClean="0"/>
-              <a:t>Class Diagrams and File Structure plan to work out what goes where and how things interact.</a:t>
+              <a:t> class which resulted in singleton methods and became rather confusing.</a:t>
             </a:r>
             <a:endParaRPr lang="en-US" dirty="0"/>
           </a:p>
@@ -8735,7 +8646,282 @@
     </p:spTree>
     <p:extLst>
       <p:ext uri="{BB962C8B-B14F-4D97-AF65-F5344CB8AC3E}">
-        <p14:creationId xmlns:p14="http://schemas.microsoft.com/office/powerpoint/2010/main" val="1677045588"/>
+        <p14:creationId xmlns:p14="http://schemas.microsoft.com/office/powerpoint/2010/main" val="1634783641"/>
+      </p:ext>
+    </p:extLst>
+  </p:cSld>
+  <p:clrMapOvr>
+    <a:masterClrMapping/>
+  </p:clrMapOvr>
+  <p:timing>
+    <p:tnLst>
+      <p:par>
+        <p:cTn xmlns:p14="http://schemas.microsoft.com/office/powerpoint/2010/main" id="1" dur="indefinite" restart="never" nodeType="tmRoot">
+          <p:childTnLst>
+            <p:seq concurrent="1" nextAc="seek">
+              <p:cTn id="2" dur="indefinite" nodeType="mainSeq">
+                <p:childTnLst>
+                  <p:par>
+                    <p:cTn id="3" fill="hold">
+                      <p:stCondLst>
+                        <p:cond delay="indefinite"/>
+                      </p:stCondLst>
+                      <p:childTnLst>
+                        <p:par>
+                          <p:cTn id="4" fill="hold">
+                            <p:stCondLst>
+                              <p:cond delay="0"/>
+                            </p:stCondLst>
+                            <p:childTnLst>
+                              <p:par>
+                                <p:cTn id="5" presetID="1" presetClass="entr" presetSubtype="0" fill="hold" nodeType="clickEffect">
+                                  <p:stCondLst>
+                                    <p:cond delay="0"/>
+                                  </p:stCondLst>
+                                  <p:childTnLst>
+                                    <p:set>
+                                      <p:cBhvr>
+                                        <p:cTn id="6" dur="1" fill="hold">
+                                          <p:stCondLst>
+                                            <p:cond delay="0"/>
+                                          </p:stCondLst>
+                                        </p:cTn>
+                                        <p:tgtEl>
+                                          <p:spTgt spid="3">
+                                            <p:txEl>
+                                              <p:pRg st="0" end="0"/>
+                                            </p:txEl>
+                                          </p:spTgt>
+                                        </p:tgtEl>
+                                        <p:attrNameLst>
+                                          <p:attrName>style.visibility</p:attrName>
+                                        </p:attrNameLst>
+                                      </p:cBhvr>
+                                      <p:to>
+                                        <p:strVal val="visible"/>
+                                      </p:to>
+                                    </p:set>
+                                  </p:childTnLst>
+                                </p:cTn>
+                              </p:par>
+                            </p:childTnLst>
+                          </p:cTn>
+                        </p:par>
+                      </p:childTnLst>
+                    </p:cTn>
+                  </p:par>
+                  <p:par>
+                    <p:cTn id="7" fill="hold">
+                      <p:stCondLst>
+                        <p:cond delay="indefinite"/>
+                      </p:stCondLst>
+                      <p:childTnLst>
+                        <p:par>
+                          <p:cTn id="8" fill="hold">
+                            <p:stCondLst>
+                              <p:cond delay="0"/>
+                            </p:stCondLst>
+                            <p:childTnLst>
+                              <p:par>
+                                <p:cTn id="9" presetID="1" presetClass="entr" presetSubtype="0" fill="hold" nodeType="clickEffect">
+                                  <p:stCondLst>
+                                    <p:cond delay="0"/>
+                                  </p:stCondLst>
+                                  <p:childTnLst>
+                                    <p:set>
+                                      <p:cBhvr>
+                                        <p:cTn id="10" dur="1" fill="hold">
+                                          <p:stCondLst>
+                                            <p:cond delay="0"/>
+                                          </p:stCondLst>
+                                        </p:cTn>
+                                        <p:tgtEl>
+                                          <p:spTgt spid="3">
+                                            <p:txEl>
+                                              <p:pRg st="1" end="1"/>
+                                            </p:txEl>
+                                          </p:spTgt>
+                                        </p:tgtEl>
+                                        <p:attrNameLst>
+                                          <p:attrName>style.visibility</p:attrName>
+                                        </p:attrNameLst>
+                                      </p:cBhvr>
+                                      <p:to>
+                                        <p:strVal val="visible"/>
+                                      </p:to>
+                                    </p:set>
+                                  </p:childTnLst>
+                                </p:cTn>
+                              </p:par>
+                            </p:childTnLst>
+                          </p:cTn>
+                        </p:par>
+                      </p:childTnLst>
+                    </p:cTn>
+                  </p:par>
+                  <p:par>
+                    <p:cTn id="11" fill="hold">
+                      <p:stCondLst>
+                        <p:cond delay="indefinite"/>
+                      </p:stCondLst>
+                      <p:childTnLst>
+                        <p:par>
+                          <p:cTn id="12" fill="hold">
+                            <p:stCondLst>
+                              <p:cond delay="0"/>
+                            </p:stCondLst>
+                            <p:childTnLst>
+                              <p:par>
+                                <p:cTn id="13" presetID="1" presetClass="entr" presetSubtype="0" fill="hold" nodeType="clickEffect">
+                                  <p:stCondLst>
+                                    <p:cond delay="0"/>
+                                  </p:stCondLst>
+                                  <p:childTnLst>
+                                    <p:set>
+                                      <p:cBhvr>
+                                        <p:cTn id="14" dur="1" fill="hold">
+                                          <p:stCondLst>
+                                            <p:cond delay="0"/>
+                                          </p:stCondLst>
+                                        </p:cTn>
+                                        <p:tgtEl>
+                                          <p:spTgt spid="3">
+                                            <p:txEl>
+                                              <p:pRg st="2" end="2"/>
+                                            </p:txEl>
+                                          </p:spTgt>
+                                        </p:tgtEl>
+                                        <p:attrNameLst>
+                                          <p:attrName>style.visibility</p:attrName>
+                                        </p:attrNameLst>
+                                      </p:cBhvr>
+                                      <p:to>
+                                        <p:strVal val="visible"/>
+                                      </p:to>
+                                    </p:set>
+                                  </p:childTnLst>
+                                </p:cTn>
+                              </p:par>
+                            </p:childTnLst>
+                          </p:cTn>
+                        </p:par>
+                      </p:childTnLst>
+                    </p:cTn>
+                  </p:par>
+                </p:childTnLst>
+              </p:cTn>
+              <p:prevCondLst>
+                <p:cond evt="onPrev" delay="0">
+                  <p:tgtEl>
+                    <p:sldTgt/>
+                  </p:tgtEl>
+                </p:cond>
+              </p:prevCondLst>
+              <p:nextCondLst>
+                <p:cond evt="onNext" delay="0">
+                  <p:tgtEl>
+                    <p:sldTgt/>
+                  </p:tgtEl>
+                </p:cond>
+              </p:nextCondLst>
+            </p:seq>
+          </p:childTnLst>
+        </p:cTn>
+      </p:par>
+    </p:tnLst>
+  </p:timing>
+</p:sld>
+</file>
+
+<file path=ppt/slides/slide6.xml><?xml version="1.0" encoding="utf-8"?>
+<p:sld xmlns:a="http://schemas.openxmlformats.org/drawingml/2006/main" xmlns:r="http://schemas.openxmlformats.org/officeDocument/2006/relationships" xmlns:p="http://schemas.openxmlformats.org/presentationml/2006/main">
+  <p:cSld>
+    <p:spTree>
+      <p:nvGrpSpPr>
+        <p:cNvPr id="1" name=""/>
+        <p:cNvGrpSpPr/>
+        <p:nvPr/>
+      </p:nvGrpSpPr>
+      <p:grpSpPr>
+        <a:xfrm>
+          <a:off x="0" y="0"/>
+          <a:ext cx="0" cy="0"/>
+          <a:chOff x="0" y="0"/>
+          <a:chExt cx="0" cy="0"/>
+        </a:xfrm>
+      </p:grpSpPr>
+      <p:sp>
+        <p:nvSpPr>
+          <p:cNvPr id="2" name="Title 1"/>
+          <p:cNvSpPr>
+            <a:spLocks noGrp="1"/>
+          </p:cNvSpPr>
+          <p:nvPr>
+            <p:ph type="title"/>
+          </p:nvPr>
+        </p:nvSpPr>
+        <p:spPr/>
+        <p:txBody>
+          <a:bodyPr/>
+          <a:lstStyle/>
+          <a:p>
+            <a:r>
+              <a:rPr lang="en-US" dirty="0" smtClean="0"/>
+              <a:t>More Issues</a:t>
+            </a:r>
+            <a:endParaRPr lang="en-US" dirty="0"/>
+          </a:p>
+        </p:txBody>
+      </p:sp>
+      <p:sp>
+        <p:nvSpPr>
+          <p:cNvPr id="3" name="Content Placeholder 2"/>
+          <p:cNvSpPr>
+            <a:spLocks noGrp="1"/>
+          </p:cNvSpPr>
+          <p:nvPr>
+            <p:ph idx="1"/>
+          </p:nvPr>
+        </p:nvSpPr>
+        <p:spPr/>
+        <p:txBody>
+          <a:bodyPr/>
+          <a:lstStyle/>
+          <a:p>
+            <a:r>
+              <a:rPr lang="en-US" dirty="0" smtClean="0"/>
+              <a:t>SQLite syntax.</a:t>
+            </a:r>
+          </a:p>
+          <a:p>
+            <a:r>
+              <a:rPr lang="en-US" dirty="0" smtClean="0"/>
+              <a:t>It is not case-sensitive, so led to a lot of ambiguous errors.</a:t>
+            </a:r>
+          </a:p>
+          <a:p>
+            <a:r>
+              <a:rPr lang="en-US" dirty="0" smtClean="0"/>
+              <a:t>Commas are important</a:t>
+            </a:r>
+            <a:r>
+              <a:rPr lang="en-US" dirty="0" smtClean="0"/>
+              <a:t>.</a:t>
+            </a:r>
+          </a:p>
+          <a:p>
+            <a:r>
+              <a:rPr lang="en-US" dirty="0" smtClean="0"/>
+              <a:t>Changing versions every time a change is made to the database.</a:t>
+            </a:r>
+            <a:endParaRPr lang="en-US" dirty="0"/>
+          </a:p>
+        </p:txBody>
+      </p:sp>
+    </p:spTree>
+    <p:extLst>
+      <p:ext uri="{BB962C8B-B14F-4D97-AF65-F5344CB8AC3E}">
+        <p14:creationId xmlns:p14="http://schemas.microsoft.com/office/powerpoint/2010/main" val="3040127520"/>
       </p:ext>
     </p:extLst>
   </p:cSld>
@@ -8971,7 +9157,7 @@
 </p:sld>
 </file>
 
-<file path=ppt/slides/slide6.xml><?xml version="1.0" encoding="utf-8"?>
+<file path=ppt/slides/slide7.xml><?xml version="1.0" encoding="utf-8"?>
 <p:sld xmlns:a="http://schemas.openxmlformats.org/drawingml/2006/main" xmlns:r="http://schemas.openxmlformats.org/officeDocument/2006/relationships" xmlns:p="http://schemas.openxmlformats.org/presentationml/2006/main">
   <p:cSld>
     <p:spTree>
@@ -9080,7 +9266,7 @@
 </p:sld>
 </file>
 
-<file path=ppt/slides/slide7.xml><?xml version="1.0" encoding="utf-8"?>
+<file path=ppt/slides/slide8.xml><?xml version="1.0" encoding="utf-8"?>
 <p:sld xmlns:a="http://schemas.openxmlformats.org/drawingml/2006/main" xmlns:r="http://schemas.openxmlformats.org/officeDocument/2006/relationships" xmlns:p="http://schemas.openxmlformats.org/presentationml/2006/main">
   <p:cSld>
     <p:spTree>
@@ -9189,119 +9375,6 @@
 </p:sld>
 </file>
 
-<file path=ppt/slides/slide8.xml><?xml version="1.0" encoding="utf-8"?>
-<p:sld xmlns:a="http://schemas.openxmlformats.org/drawingml/2006/main" xmlns:r="http://schemas.openxmlformats.org/officeDocument/2006/relationships" xmlns:p="http://schemas.openxmlformats.org/presentationml/2006/main">
-  <p:cSld>
-    <p:spTree>
-      <p:nvGrpSpPr>
-        <p:cNvPr id="1" name=""/>
-        <p:cNvGrpSpPr/>
-        <p:nvPr/>
-      </p:nvGrpSpPr>
-      <p:grpSpPr>
-        <a:xfrm>
-          <a:off x="0" y="0"/>
-          <a:ext cx="0" cy="0"/>
-          <a:chOff x="0" y="0"/>
-          <a:chExt cx="0" cy="0"/>
-        </a:xfrm>
-      </p:grpSpPr>
-      <p:sp>
-        <p:nvSpPr>
-          <p:cNvPr id="2" name="Title 1"/>
-          <p:cNvSpPr>
-            <a:spLocks noGrp="1"/>
-          </p:cNvSpPr>
-          <p:nvPr>
-            <p:ph type="title"/>
-          </p:nvPr>
-        </p:nvSpPr>
-        <p:spPr/>
-        <p:txBody>
-          <a:bodyPr/>
-          <a:lstStyle/>
-          <a:p>
-            <a:r>
-              <a:rPr lang="en-US" dirty="0" smtClean="0"/>
-              <a:t>Features to add</a:t>
-            </a:r>
-            <a:endParaRPr lang="en-US" dirty="0"/>
-          </a:p>
-        </p:txBody>
-      </p:sp>
-      <p:sp>
-        <p:nvSpPr>
-          <p:cNvPr id="3" name="Content Placeholder 2"/>
-          <p:cNvSpPr>
-            <a:spLocks noGrp="1"/>
-          </p:cNvSpPr>
-          <p:nvPr>
-            <p:ph idx="1"/>
-          </p:nvPr>
-        </p:nvSpPr>
-        <p:spPr/>
-        <p:txBody>
-          <a:bodyPr/>
-          <a:lstStyle/>
-          <a:p>
-            <a:r>
-              <a:rPr lang="en-US" dirty="0" smtClean="0"/>
-              <a:t>Recommended spirits.</a:t>
-            </a:r>
-          </a:p>
-          <a:p>
-            <a:r>
-              <a:rPr lang="en-US" dirty="0" smtClean="0"/>
-              <a:t>Recommended bars.</a:t>
-            </a:r>
-          </a:p>
-          <a:p>
-            <a:r>
-              <a:rPr lang="en-US" dirty="0" smtClean="0"/>
-              <a:t>More filter options.</a:t>
-            </a:r>
-          </a:p>
-          <a:p>
-            <a:r>
-              <a:rPr lang="en-US" dirty="0" smtClean="0"/>
-              <a:t>More graphics.</a:t>
-            </a:r>
-          </a:p>
-          <a:p>
-            <a:r>
-              <a:rPr lang="en-US" dirty="0" smtClean="0"/>
-              <a:t>Refactor code to make it DRY.</a:t>
-            </a:r>
-          </a:p>
-          <a:p>
-            <a:r>
-              <a:rPr lang="en-US" dirty="0" smtClean="0"/>
-              <a:t>Refactor code so methods are in the right place.</a:t>
-            </a:r>
-            <a:endParaRPr lang="en-US" dirty="0"/>
-          </a:p>
-        </p:txBody>
-      </p:sp>
-    </p:spTree>
-    <p:extLst>
-      <p:ext uri="{BB962C8B-B14F-4D97-AF65-F5344CB8AC3E}">
-        <p14:creationId xmlns:p14="http://schemas.microsoft.com/office/powerpoint/2010/main" val="2453086237"/>
-      </p:ext>
-    </p:extLst>
-  </p:cSld>
-  <p:clrMapOvr>
-    <a:masterClrMapping/>
-  </p:clrMapOvr>
-  <p:timing>
-    <p:tnLst>
-      <p:par>
-        <p:cTn xmlns:p14="http://schemas.microsoft.com/office/powerpoint/2010/main" id="1" dur="indefinite" restart="never" nodeType="tmRoot"/>
-      </p:par>
-    </p:tnLst>
-  </p:timing>
-</p:sld>
-</file>
-
 <file path=ppt/slides/slide9.xml><?xml version="1.0" encoding="utf-8"?>
 <p:sld xmlns:a="http://schemas.openxmlformats.org/drawingml/2006/main" xmlns:r="http://schemas.openxmlformats.org/officeDocument/2006/relationships" xmlns:p="http://schemas.openxmlformats.org/presentationml/2006/main">
   <p:cSld>
@@ -9336,7 +9409,7 @@
           <a:p>
             <a:r>
               <a:rPr lang="en-US" dirty="0" smtClean="0"/>
-              <a:t>Things to do better.</a:t>
+              <a:t>Features to add</a:t>
             </a:r>
             <a:endParaRPr lang="en-US" dirty="0"/>
           </a:p>
@@ -9359,19 +9432,37 @@
           <a:p>
             <a:r>
               <a:rPr lang="en-US" dirty="0" smtClean="0"/>
-              <a:t>More planning.</a:t>
+              <a:t>Recommended spirits.</a:t>
             </a:r>
           </a:p>
           <a:p>
             <a:r>
               <a:rPr lang="en-US" dirty="0" smtClean="0"/>
-              <a:t>Don’t read several tutorials at once.</a:t>
+              <a:t>Recommended bars.</a:t>
             </a:r>
           </a:p>
           <a:p>
             <a:r>
               <a:rPr lang="en-US" dirty="0" smtClean="0"/>
-              <a:t>Better naming conventions.</a:t>
+              <a:t>More filter options.</a:t>
+            </a:r>
+          </a:p>
+          <a:p>
+            <a:r>
+              <a:rPr lang="en-US" dirty="0" smtClean="0"/>
+              <a:t>More graphics.</a:t>
+            </a:r>
+          </a:p>
+          <a:p>
+            <a:r>
+              <a:rPr lang="en-US" dirty="0" smtClean="0"/>
+              <a:t>Refactor code to make it DRY.</a:t>
+            </a:r>
+          </a:p>
+          <a:p>
+            <a:r>
+              <a:rPr lang="en-US" dirty="0" smtClean="0"/>
+              <a:t>Refactor code so methods are in the right place.</a:t>
             </a:r>
             <a:endParaRPr lang="en-US" dirty="0"/>
           </a:p>
@@ -9380,7 +9471,7 @@
     </p:spTree>
     <p:extLst>
       <p:ext uri="{BB962C8B-B14F-4D97-AF65-F5344CB8AC3E}">
-        <p14:creationId xmlns:p14="http://schemas.microsoft.com/office/powerpoint/2010/main" val="2734469215"/>
+        <p14:creationId xmlns:p14="http://schemas.microsoft.com/office/powerpoint/2010/main" val="2453086237"/>
       </p:ext>
     </p:extLst>
   </p:cSld>
@@ -9390,7 +9481,324 @@
   <p:timing>
     <p:tnLst>
       <p:par>
-        <p:cTn xmlns:p14="http://schemas.microsoft.com/office/powerpoint/2010/main" id="1" dur="indefinite" restart="never" nodeType="tmRoot"/>
+        <p:cTn xmlns:p14="http://schemas.microsoft.com/office/powerpoint/2010/main" id="1" dur="indefinite" restart="never" nodeType="tmRoot">
+          <p:childTnLst>
+            <p:seq concurrent="1" nextAc="seek">
+              <p:cTn id="2" dur="indefinite" nodeType="mainSeq">
+                <p:childTnLst>
+                  <p:par>
+                    <p:cTn id="3" fill="hold">
+                      <p:stCondLst>
+                        <p:cond delay="indefinite"/>
+                      </p:stCondLst>
+                      <p:childTnLst>
+                        <p:par>
+                          <p:cTn id="4" fill="hold">
+                            <p:stCondLst>
+                              <p:cond delay="0"/>
+                            </p:stCondLst>
+                            <p:childTnLst>
+                              <p:par>
+                                <p:cTn id="5" presetID="1" presetClass="entr" presetSubtype="0" fill="hold" nodeType="clickEffect">
+                                  <p:stCondLst>
+                                    <p:cond delay="0"/>
+                                  </p:stCondLst>
+                                  <p:childTnLst>
+                                    <p:set>
+                                      <p:cBhvr>
+                                        <p:cTn id="6" dur="1" fill="hold">
+                                          <p:stCondLst>
+                                            <p:cond delay="0"/>
+                                          </p:stCondLst>
+                                        </p:cTn>
+                                        <p:tgtEl>
+                                          <p:spTgt spid="3">
+                                            <p:txEl>
+                                              <p:pRg st="0" end="0"/>
+                                            </p:txEl>
+                                          </p:spTgt>
+                                        </p:tgtEl>
+                                        <p:attrNameLst>
+                                          <p:attrName>style.visibility</p:attrName>
+                                        </p:attrNameLst>
+                                      </p:cBhvr>
+                                      <p:to>
+                                        <p:strVal val="visible"/>
+                                      </p:to>
+                                    </p:set>
+                                  </p:childTnLst>
+                                </p:cTn>
+                              </p:par>
+                            </p:childTnLst>
+                          </p:cTn>
+                        </p:par>
+                      </p:childTnLst>
+                    </p:cTn>
+                  </p:par>
+                  <p:par>
+                    <p:cTn id="7" fill="hold">
+                      <p:stCondLst>
+                        <p:cond delay="indefinite"/>
+                      </p:stCondLst>
+                      <p:childTnLst>
+                        <p:par>
+                          <p:cTn id="8" fill="hold">
+                            <p:stCondLst>
+                              <p:cond delay="0"/>
+                            </p:stCondLst>
+                            <p:childTnLst>
+                              <p:par>
+                                <p:cTn id="9" presetID="1" presetClass="entr" presetSubtype="0" fill="hold" nodeType="clickEffect">
+                                  <p:stCondLst>
+                                    <p:cond delay="0"/>
+                                  </p:stCondLst>
+                                  <p:childTnLst>
+                                    <p:set>
+                                      <p:cBhvr>
+                                        <p:cTn id="10" dur="1" fill="hold">
+                                          <p:stCondLst>
+                                            <p:cond delay="0"/>
+                                          </p:stCondLst>
+                                        </p:cTn>
+                                        <p:tgtEl>
+                                          <p:spTgt spid="3">
+                                            <p:txEl>
+                                              <p:pRg st="1" end="1"/>
+                                            </p:txEl>
+                                          </p:spTgt>
+                                        </p:tgtEl>
+                                        <p:attrNameLst>
+                                          <p:attrName>style.visibility</p:attrName>
+                                        </p:attrNameLst>
+                                      </p:cBhvr>
+                                      <p:to>
+                                        <p:strVal val="visible"/>
+                                      </p:to>
+                                    </p:set>
+                                  </p:childTnLst>
+                                </p:cTn>
+                              </p:par>
+                            </p:childTnLst>
+                          </p:cTn>
+                        </p:par>
+                      </p:childTnLst>
+                    </p:cTn>
+                  </p:par>
+                  <p:par>
+                    <p:cTn id="11" fill="hold">
+                      <p:stCondLst>
+                        <p:cond delay="indefinite"/>
+                      </p:stCondLst>
+                      <p:childTnLst>
+                        <p:par>
+                          <p:cTn id="12" fill="hold">
+                            <p:stCondLst>
+                              <p:cond delay="0"/>
+                            </p:stCondLst>
+                            <p:childTnLst>
+                              <p:par>
+                                <p:cTn id="13" presetID="1" presetClass="entr" presetSubtype="0" fill="hold" nodeType="clickEffect">
+                                  <p:stCondLst>
+                                    <p:cond delay="0"/>
+                                  </p:stCondLst>
+                                  <p:childTnLst>
+                                    <p:set>
+                                      <p:cBhvr>
+                                        <p:cTn id="14" dur="1" fill="hold">
+                                          <p:stCondLst>
+                                            <p:cond delay="0"/>
+                                          </p:stCondLst>
+                                        </p:cTn>
+                                        <p:tgtEl>
+                                          <p:spTgt spid="3">
+                                            <p:txEl>
+                                              <p:pRg st="2" end="2"/>
+                                            </p:txEl>
+                                          </p:spTgt>
+                                        </p:tgtEl>
+                                        <p:attrNameLst>
+                                          <p:attrName>style.visibility</p:attrName>
+                                        </p:attrNameLst>
+                                      </p:cBhvr>
+                                      <p:to>
+                                        <p:strVal val="visible"/>
+                                      </p:to>
+                                    </p:set>
+                                  </p:childTnLst>
+                                </p:cTn>
+                              </p:par>
+                            </p:childTnLst>
+                          </p:cTn>
+                        </p:par>
+                      </p:childTnLst>
+                    </p:cTn>
+                  </p:par>
+                  <p:par>
+                    <p:cTn id="15" fill="hold">
+                      <p:stCondLst>
+                        <p:cond delay="indefinite"/>
+                      </p:stCondLst>
+                      <p:childTnLst>
+                        <p:par>
+                          <p:cTn id="16" fill="hold">
+                            <p:stCondLst>
+                              <p:cond delay="0"/>
+                            </p:stCondLst>
+                            <p:childTnLst>
+                              <p:par>
+                                <p:cTn id="17" presetID="1" presetClass="entr" presetSubtype="0" fill="hold" nodeType="clickEffect">
+                                  <p:stCondLst>
+                                    <p:cond delay="0"/>
+                                  </p:stCondLst>
+                                  <p:childTnLst>
+                                    <p:set>
+                                      <p:cBhvr>
+                                        <p:cTn id="18" dur="1" fill="hold">
+                                          <p:stCondLst>
+                                            <p:cond delay="0"/>
+                                          </p:stCondLst>
+                                        </p:cTn>
+                                        <p:tgtEl>
+                                          <p:spTgt spid="3">
+                                            <p:txEl>
+                                              <p:pRg st="3" end="3"/>
+                                            </p:txEl>
+                                          </p:spTgt>
+                                        </p:tgtEl>
+                                        <p:attrNameLst>
+                                          <p:attrName>style.visibility</p:attrName>
+                                        </p:attrNameLst>
+                                      </p:cBhvr>
+                                      <p:to>
+                                        <p:strVal val="visible"/>
+                                      </p:to>
+                                    </p:set>
+                                  </p:childTnLst>
+                                </p:cTn>
+                              </p:par>
+                            </p:childTnLst>
+                          </p:cTn>
+                        </p:par>
+                      </p:childTnLst>
+                    </p:cTn>
+                  </p:par>
+                  <p:par>
+                    <p:cTn id="19" fill="hold">
+                      <p:stCondLst>
+                        <p:cond delay="indefinite"/>
+                      </p:stCondLst>
+                      <p:childTnLst>
+                        <p:par>
+                          <p:cTn id="20" fill="hold">
+                            <p:stCondLst>
+                              <p:cond delay="0"/>
+                            </p:stCondLst>
+                            <p:childTnLst>
+                              <p:par>
+                                <p:cTn id="21" presetID="1" presetClass="entr" presetSubtype="0" fill="hold" nodeType="clickEffect">
+                                  <p:stCondLst>
+                                    <p:cond delay="0"/>
+                                  </p:stCondLst>
+                                  <p:childTnLst>
+                                    <p:set>
+                                      <p:cBhvr>
+                                        <p:cTn id="22" dur="1" fill="hold">
+                                          <p:stCondLst>
+                                            <p:cond delay="0"/>
+                                          </p:stCondLst>
+                                        </p:cTn>
+                                        <p:tgtEl>
+                                          <p:spTgt spid="3">
+                                            <p:txEl>
+                                              <p:pRg st="4" end="4"/>
+                                            </p:txEl>
+                                          </p:spTgt>
+                                        </p:tgtEl>
+                                        <p:attrNameLst>
+                                          <p:attrName>style.visibility</p:attrName>
+                                        </p:attrNameLst>
+                                      </p:cBhvr>
+                                      <p:to>
+                                        <p:strVal val="visible"/>
+                                      </p:to>
+                                    </p:set>
+                                  </p:childTnLst>
+                                </p:cTn>
+                              </p:par>
+                            </p:childTnLst>
+                          </p:cTn>
+                        </p:par>
+                      </p:childTnLst>
+                    </p:cTn>
+                  </p:par>
+                  <p:par>
+                    <p:cTn id="23" fill="hold">
+                      <p:stCondLst>
+                        <p:cond delay="indefinite"/>
+                      </p:stCondLst>
+                      <p:childTnLst>
+                        <p:par>
+                          <p:cTn id="24" fill="hold">
+                            <p:stCondLst>
+                              <p:cond delay="0"/>
+                            </p:stCondLst>
+                            <p:childTnLst>
+                              <p:par>
+                                <p:cTn id="25" presetID="1" presetClass="entr" presetSubtype="0" fill="hold" nodeType="clickEffect">
+                                  <p:stCondLst>
+                                    <p:cond delay="0"/>
+                                  </p:stCondLst>
+                                  <p:childTnLst>
+                                    <p:set>
+                                      <p:cBhvr>
+                                        <p:cTn id="26" dur="1" fill="hold">
+                                          <p:stCondLst>
+                                            <p:cond delay="0"/>
+                                          </p:stCondLst>
+                                        </p:cTn>
+                                        <p:tgtEl>
+                                          <p:spTgt spid="3">
+                                            <p:txEl>
+                                              <p:pRg st="5" end="5"/>
+                                            </p:txEl>
+                                          </p:spTgt>
+                                        </p:tgtEl>
+                                        <p:attrNameLst>
+                                          <p:attrName>style.visibility</p:attrName>
+                                        </p:attrNameLst>
+                                      </p:cBhvr>
+                                      <p:to>
+                                        <p:strVal val="visible"/>
+                                      </p:to>
+                                    </p:set>
+                                  </p:childTnLst>
+                                </p:cTn>
+                              </p:par>
+                            </p:childTnLst>
+                          </p:cTn>
+                        </p:par>
+                      </p:childTnLst>
+                    </p:cTn>
+                  </p:par>
+                </p:childTnLst>
+              </p:cTn>
+              <p:prevCondLst>
+                <p:cond evt="onPrev" delay="0">
+                  <p:tgtEl>
+                    <p:sldTgt/>
+                  </p:tgtEl>
+                </p:cond>
+              </p:prevCondLst>
+              <p:nextCondLst>
+                <p:cond evt="onNext" delay="0">
+                  <p:tgtEl>
+                    <p:sldTgt/>
+                  </p:tgtEl>
+                </p:cond>
+              </p:nextCondLst>
+            </p:seq>
+          </p:childTnLst>
+        </p:cTn>
       </p:par>
     </p:tnLst>
   </p:timing>

</xml_diff>